<commit_message>
Added a link to site explaining pusing a repository up to Git Hub
</commit_message>
<xml_diff>
--- a/Git.pptx
+++ b/Git.pptx
@@ -125,6 +125,8 @@
     <p:sldId id="374" r:id="rId119"/>
     <p:sldId id="375" r:id="rId120"/>
     <p:sldId id="376" r:id="rId121"/>
+    <p:sldId id="377" r:id="rId122"/>
+    <p:sldId id="378" r:id="rId123"/>
   </p:sldIdLst>
   <p:sldSz cx="9144000" cy="6858000" type="screen4x3"/>
   <p:notesSz cx="6858000" cy="9144000"/>
@@ -407,7 +409,7 @@
           <a:p>
             <a:fld id="{EB95436A-2611-492F-BCBA-EB6694E7A6AE}" type="datetimeFigureOut">
               <a:rPr lang="en-US" smtClean="0"/>
-              <a:t>5/26/2016</a:t>
+              <a:t>8/18/2016</a:t>
             </a:fld>
             <a:endParaRPr lang="en-US"/>
           </a:p>
@@ -577,7 +579,7 @@
           <a:p>
             <a:fld id="{EB95436A-2611-492F-BCBA-EB6694E7A6AE}" type="datetimeFigureOut">
               <a:rPr lang="en-US" smtClean="0"/>
-              <a:t>5/26/2016</a:t>
+              <a:t>8/18/2016</a:t>
             </a:fld>
             <a:endParaRPr lang="en-US"/>
           </a:p>
@@ -757,7 +759,7 @@
           <a:p>
             <a:fld id="{EB95436A-2611-492F-BCBA-EB6694E7A6AE}" type="datetimeFigureOut">
               <a:rPr lang="en-US" smtClean="0"/>
-              <a:t>5/26/2016</a:t>
+              <a:t>8/18/2016</a:t>
             </a:fld>
             <a:endParaRPr lang="en-US"/>
           </a:p>
@@ -927,7 +929,7 @@
           <a:p>
             <a:fld id="{EB95436A-2611-492F-BCBA-EB6694E7A6AE}" type="datetimeFigureOut">
               <a:rPr lang="en-US" smtClean="0"/>
-              <a:t>5/26/2016</a:t>
+              <a:t>8/18/2016</a:t>
             </a:fld>
             <a:endParaRPr lang="en-US"/>
           </a:p>
@@ -1173,7 +1175,7 @@
           <a:p>
             <a:fld id="{EB95436A-2611-492F-BCBA-EB6694E7A6AE}" type="datetimeFigureOut">
               <a:rPr lang="en-US" smtClean="0"/>
-              <a:t>5/26/2016</a:t>
+              <a:t>8/18/2016</a:t>
             </a:fld>
             <a:endParaRPr lang="en-US"/>
           </a:p>
@@ -1461,7 +1463,7 @@
           <a:p>
             <a:fld id="{EB95436A-2611-492F-BCBA-EB6694E7A6AE}" type="datetimeFigureOut">
               <a:rPr lang="en-US" smtClean="0"/>
-              <a:t>5/26/2016</a:t>
+              <a:t>8/18/2016</a:t>
             </a:fld>
             <a:endParaRPr lang="en-US"/>
           </a:p>
@@ -1883,7 +1885,7 @@
           <a:p>
             <a:fld id="{EB95436A-2611-492F-BCBA-EB6694E7A6AE}" type="datetimeFigureOut">
               <a:rPr lang="en-US" smtClean="0"/>
-              <a:t>5/26/2016</a:t>
+              <a:t>8/18/2016</a:t>
             </a:fld>
             <a:endParaRPr lang="en-US"/>
           </a:p>
@@ -2001,7 +2003,7 @@
           <a:p>
             <a:fld id="{EB95436A-2611-492F-BCBA-EB6694E7A6AE}" type="datetimeFigureOut">
               <a:rPr lang="en-US" smtClean="0"/>
-              <a:t>5/26/2016</a:t>
+              <a:t>8/18/2016</a:t>
             </a:fld>
             <a:endParaRPr lang="en-US"/>
           </a:p>
@@ -2096,7 +2098,7 @@
           <a:p>
             <a:fld id="{EB95436A-2611-492F-BCBA-EB6694E7A6AE}" type="datetimeFigureOut">
               <a:rPr lang="en-US" smtClean="0"/>
-              <a:t>5/26/2016</a:t>
+              <a:t>8/18/2016</a:t>
             </a:fld>
             <a:endParaRPr lang="en-US"/>
           </a:p>
@@ -2373,7 +2375,7 @@
           <a:p>
             <a:fld id="{EB95436A-2611-492F-BCBA-EB6694E7A6AE}" type="datetimeFigureOut">
               <a:rPr lang="en-US" smtClean="0"/>
-              <a:t>5/26/2016</a:t>
+              <a:t>8/18/2016</a:t>
             </a:fld>
             <a:endParaRPr lang="en-US"/>
           </a:p>
@@ -2626,7 +2628,7 @@
           <a:p>
             <a:fld id="{EB95436A-2611-492F-BCBA-EB6694E7A6AE}" type="datetimeFigureOut">
               <a:rPr lang="en-US" smtClean="0"/>
-              <a:t>5/26/2016</a:t>
+              <a:t>8/18/2016</a:t>
             </a:fld>
             <a:endParaRPr lang="en-US"/>
           </a:p>
@@ -2839,7 +2841,7 @@
           <a:p>
             <a:fld id="{EB95436A-2611-492F-BCBA-EB6694E7A6AE}" type="datetimeFigureOut">
               <a:rPr lang="en-US" smtClean="0"/>
-              <a:t>5/26/2016</a:t>
+              <a:t>8/18/2016</a:t>
             </a:fld>
             <a:endParaRPr lang="en-US"/>
           </a:p>
@@ -3715,11 +3717,7 @@
             </a:r>
             <a:r>
               <a:rPr lang="en-US" sz="1800" dirty="0"/>
-              <a:t> checkout</a:t>
-            </a:r>
-            <a:r>
-              <a:rPr lang="en-US" sz="1800" dirty="0"/>
-              <a:t> serves as a way to revert back to an old version of an individual file.</a:t>
+              <a:t> checkout serves as a way to revert back to an old version of an individual file.</a:t>
             </a:r>
             <a:endParaRPr lang="en-US" dirty="0"/>
           </a:p>
@@ -4595,21 +4593,8 @@
             </a:r>
             <a:r>
               <a:rPr lang="en-US" sz="2000" dirty="0"/>
-              <a:t> checkout</a:t>
-            </a:r>
-            <a:r>
-              <a:rPr lang="en-US" sz="2000" dirty="0"/>
-              <a:t> to fetch an old version of it. For example, if you only wanted to see the </a:t>
-            </a:r>
-            <a:r>
-              <a:rPr lang="en-US" sz="2000" dirty="0"/>
-              <a:t>hello.py</a:t>
-            </a:r>
-            <a:r>
-              <a:rPr lang="en-US" sz="2000" dirty="0"/>
-              <a:t> file from the old commit, you could use the following command:</a:t>
-            </a:r>
-            <a:endParaRPr lang="en-US" sz="2000" dirty="0"/>
+              <a:t> checkout to fetch an old version of it. For example, if you only wanted to see the hello.py file from the old commit, you could use the following command:</a:t>
+            </a:r>
           </a:p>
         </p:txBody>
       </p:sp>
@@ -4838,7 +4823,6 @@
               <a:rPr lang="en-US" sz="2400" dirty="0"/>
               <a:t> affect the current state of your project. The old file revision will show up as a “Change to be committed,” giving you the opportunity to revert back to the previous version of the file. If you decide you don’t want to keep the old version, you can check out the most recent version with the following:</a:t>
             </a:r>
-            <a:endParaRPr lang="en-US" sz="2400" dirty="0"/>
           </a:p>
         </p:txBody>
       </p:sp>
@@ -5048,7 +5032,6 @@
               <a:rPr lang="en-US" dirty="0"/>
               <a:t> from losing history, which is important for the integrity of your revision history and for reliable collaboration.</a:t>
             </a:r>
-            <a:endParaRPr lang="en-US" dirty="0"/>
           </a:p>
         </p:txBody>
       </p:sp>
@@ -5256,13 +5239,6 @@
               </a:rPr>
               <a:t> checkout master</a:t>
             </a:r>
-            <a:endParaRPr lang="en-US" dirty="0">
-              <a:solidFill>
-                <a:schemeClr val="bg1">
-                  <a:lumMod val="50000"/>
-                </a:schemeClr>
-              </a:solidFill>
-            </a:endParaRPr>
           </a:p>
         </p:txBody>
       </p:sp>
@@ -5427,15 +5403,7 @@
           <a:p>
             <a:r>
               <a:rPr lang="en-US" sz="2600" dirty="0"/>
-              <a:t>Generate a new commit that undoes all of the changes introduced in </a:t>
-            </a:r>
-            <a:r>
-              <a:rPr lang="en-US" sz="2600" dirty="0"/>
-              <a:t>&lt;commit&gt;</a:t>
-            </a:r>
-            <a:r>
-              <a:rPr lang="en-US" sz="2600" dirty="0"/>
-              <a:t>, then apply it to the current branch</a:t>
+              <a:t>Generate a new commit that undoes all of the changes introduced in &lt;commit&gt;, then apply it to the current branch</a:t>
             </a:r>
             <a:r>
               <a:rPr lang="en-US" sz="2600" dirty="0" smtClean="0"/>
@@ -5876,11 +5844,7 @@
             </a:r>
             <a:r>
               <a:rPr lang="en-US" sz="1800" dirty="0"/>
-              <a:t> revert</a:t>
-            </a:r>
-            <a:r>
-              <a:rPr lang="en-US" sz="1800" dirty="0"/>
-              <a:t> is able to target an individual commit at an arbitrary point in the history, whereas </a:t>
+              <a:t> revert is able to target an individual commit at an arbitrary point in the history, whereas </a:t>
             </a:r>
             <a:r>
               <a:rPr lang="en-US" sz="1800" dirty="0" err="1"/>
@@ -5888,11 +5852,7 @@
             </a:r>
             <a:r>
               <a:rPr lang="en-US" sz="1800" dirty="0"/>
-              <a:t> reset</a:t>
-            </a:r>
-            <a:r>
-              <a:rPr lang="en-US" sz="1800" dirty="0"/>
-              <a:t> can only work backwards from the current commit. For example, if you wanted to undo an old commit with </a:t>
+              <a:t> reset can only work backwards from the current commit. For example, if you wanted to undo an old commit with </a:t>
             </a:r>
             <a:r>
               <a:rPr lang="en-US" sz="1800" dirty="0" err="1"/>
@@ -5900,13 +5860,8 @@
             </a:r>
             <a:r>
               <a:rPr lang="en-US" sz="1800" dirty="0"/>
-              <a:t> reset</a:t>
-            </a:r>
-            <a:r>
-              <a:rPr lang="en-US" sz="1800" dirty="0"/>
-              <a:t>, you would have to remove all of the commits that occurred after the target commit, remove it, then re-commit all of the subsequent commits. Needless to say, this is not an elegant undo solution.</a:t>
-            </a:r>
-            <a:endParaRPr lang="en-US" sz="1800" dirty="0"/>
+              <a:t> reset, you would have to remove all of the commits that occurred after the target commit, remove it, then re-commit all of the subsequent commits. Needless to say, this is not an elegant undo solution.</a:t>
+            </a:r>
           </a:p>
         </p:txBody>
       </p:sp>
@@ -6118,13 +6073,8 @@
             </a:r>
             <a:r>
               <a:rPr lang="en-US" sz="1800" dirty="0"/>
-              <a:t> revert</a:t>
-            </a:r>
-            <a:r>
-              <a:rPr lang="en-US" sz="1800" dirty="0"/>
-              <a:t>. It commits a snapshot, then immediately undoes it with a revert.</a:t>
-            </a:r>
-            <a:endParaRPr lang="en-US" sz="1800" dirty="0"/>
+              <a:t> revert. It commits a snapshot, then immediately undoes it with a revert.</a:t>
+            </a:r>
           </a:p>
         </p:txBody>
       </p:sp>
@@ -6345,7 +6295,6 @@
               <a:rPr lang="en-US" sz="1800" dirty="0"/>
               <a:t>This can be visualized as the following:</a:t>
             </a:r>
-            <a:endParaRPr lang="en-US" sz="1800" dirty="0"/>
           </a:p>
         </p:txBody>
       </p:sp>
@@ -6626,13 +6575,8 @@
             </a:r>
             <a:r>
               <a:rPr lang="en-US" sz="1800" dirty="0"/>
-              <a:t> revert</a:t>
-            </a:r>
-            <a:r>
-              <a:rPr lang="en-US" sz="1800" dirty="0"/>
-              <a:t> added a new commit to undo its changes. As a result, the 3rd and 5th commits represent the exact same code base, and the 4th commit is still in our history just in case we want to go back to it down the road.</a:t>
-            </a:r>
-            <a:endParaRPr lang="en-US" sz="1800" dirty="0"/>
+              <a:t> revert added a new commit to undo its changes. As a result, the 3rd and 5th commits represent the exact same code base, and the 4th commit is still in our history just in case we want to go back to it down the road.</a:t>
+            </a:r>
           </a:p>
         </p:txBody>
       </p:sp>
@@ -6768,11 +6712,7 @@
             </a:r>
             <a:r>
               <a:rPr lang="en-US" sz="1800" dirty="0"/>
-              <a:t> revert</a:t>
-            </a:r>
-            <a:r>
-              <a:rPr lang="en-US" sz="1800" dirty="0"/>
-              <a:t> is a “safe” way to undo changes, you can think of </a:t>
+              <a:t> revert is a “safe” way to undo changes, you can think of </a:t>
             </a:r>
             <a:r>
               <a:rPr lang="en-US" sz="1800" dirty="0" err="1"/>
@@ -6780,11 +6720,7 @@
             </a:r>
             <a:r>
               <a:rPr lang="en-US" sz="1800" dirty="0"/>
-              <a:t> reset</a:t>
-            </a:r>
-            <a:r>
-              <a:rPr lang="en-US" sz="1800" dirty="0"/>
-              <a:t> as the </a:t>
+              <a:t> reset as the </a:t>
             </a:r>
             <a:r>
               <a:rPr lang="en-US" sz="1800" i="1" dirty="0"/>
@@ -6811,11 +6747,7 @@
             </a:r>
             <a:r>
               <a:rPr lang="en-US" sz="1800" dirty="0"/>
-              <a:t> reset</a:t>
-            </a:r>
-            <a:r>
-              <a:rPr lang="en-US" sz="1800" dirty="0"/>
-              <a:t>(and the commits are no longer referenced by any ref or the </a:t>
+              <a:t> reset(and the commits are no longer referenced by any ref or the </a:t>
             </a:r>
             <a:r>
               <a:rPr lang="en-US" sz="1800" dirty="0" err="1"/>
@@ -6888,11 +6820,7 @@
             </a:r>
             <a:r>
               <a:rPr lang="en-US" sz="1800" dirty="0"/>
-              <a:t> reset</a:t>
-            </a:r>
-            <a:r>
-              <a:rPr lang="en-US" sz="1800" dirty="0"/>
-              <a:t> is a versatile command with many configurations. </a:t>
+              <a:t> reset is a versatile command with many configurations. </a:t>
             </a:r>
             <a:endParaRPr lang="en-US" sz="1800" dirty="0" smtClean="0"/>
           </a:p>
@@ -6924,7 +6852,6 @@
               <a:rPr lang="en-US" sz="1800" dirty="0"/>
               <a:t> changes—you should never reset snapshots that have been shared with other developers.</a:t>
             </a:r>
-            <a:endParaRPr lang="en-US" sz="1800" dirty="0"/>
           </a:p>
         </p:txBody>
       </p:sp>
@@ -7073,13 +7000,6 @@
               </a:rPr>
               <a:t> reset &lt;file&gt;</a:t>
             </a:r>
-            <a:endParaRPr lang="en-US" dirty="0">
-              <a:solidFill>
-                <a:schemeClr val="bg1">
-                  <a:lumMod val="50000"/>
-                </a:schemeClr>
-              </a:solidFill>
-            </a:endParaRPr>
           </a:p>
         </p:txBody>
       </p:sp>
@@ -7254,7 +7174,6 @@
               <a:rPr lang="en-US" sz="1800" dirty="0"/>
               <a:t> a file without overwriting any changes.</a:t>
             </a:r>
-            <a:endParaRPr lang="en-US" sz="1800" dirty="0"/>
           </a:p>
         </p:txBody>
       </p:sp>
@@ -7504,7 +7423,6 @@
               <a:rPr lang="en-US" sz="1800" dirty="0"/>
               <a:t> files without overwriting any changes, giving you the opportunity to re-build the staged snapshot from scratch.</a:t>
             </a:r>
-            <a:endParaRPr lang="en-US" sz="1800" dirty="0"/>
           </a:p>
         </p:txBody>
       </p:sp>
@@ -7744,15 +7662,7 @@
             </a:r>
             <a:r>
               <a:rPr lang="en-US" sz="1800" dirty="0"/>
-              <a:t> changes, the </a:t>
-            </a:r>
-            <a:r>
-              <a:rPr lang="en-US" sz="1800" dirty="0"/>
-              <a:t>--hard</a:t>
-            </a:r>
-            <a:r>
-              <a:rPr lang="en-US" sz="1800" dirty="0"/>
-              <a:t> flag tells </a:t>
+              <a:t> changes, the --hard flag tells </a:t>
             </a:r>
             <a:r>
               <a:rPr lang="en-US" sz="1800" dirty="0" err="1"/>
@@ -7781,7 +7691,6 @@
               <a:rPr lang="en-US" sz="1800" dirty="0"/>
               <a:t> all uncommitted changes, so make sure you really want to throw away your local developments before using it.</a:t>
             </a:r>
-            <a:endParaRPr lang="en-US" sz="1800" dirty="0"/>
           </a:p>
         </p:txBody>
       </p:sp>
@@ -8251,15 +8160,7 @@
           <a:p>
             <a:r>
               <a:rPr lang="en-US" sz="1800" dirty="0"/>
-              <a:t>Move the current branch tip backward to </a:t>
-            </a:r>
-            <a:r>
-              <a:rPr lang="en-US" sz="1800" dirty="0"/>
-              <a:t>&lt;commit&gt;</a:t>
-            </a:r>
-            <a:r>
-              <a:rPr lang="en-US" sz="1800" dirty="0"/>
-              <a:t>, reset the staging area to match, but leave the working directory alone. </a:t>
+              <a:t>Move the current branch tip backward to &lt;commit&gt;, reset the staging area to match, but leave the working directory alone. </a:t>
             </a:r>
             <a:endParaRPr lang="en-US" sz="1800" dirty="0" smtClean="0"/>
           </a:p>
@@ -8270,17 +8171,8 @@
             </a:r>
             <a:r>
               <a:rPr lang="en-US" sz="1800" dirty="0"/>
-              <a:t>changes made since </a:t>
-            </a:r>
-            <a:r>
-              <a:rPr lang="en-US" sz="1800" dirty="0"/>
-              <a:t>&lt;commit&gt;</a:t>
-            </a:r>
-            <a:r>
-              <a:rPr lang="en-US" sz="1800" dirty="0"/>
-              <a:t> will reside in the working directory, which lets you re-commit the project history using cleaner, more atomic snapshots.</a:t>
-            </a:r>
-            <a:endParaRPr lang="en-US" sz="1800" dirty="0"/>
+              <a:t>changes made since &lt;commit&gt; will reside in the working directory, which lets you re-commit the project history using cleaner, more atomic snapshots.</a:t>
+            </a:r>
           </a:p>
         </p:txBody>
       </p:sp>
@@ -8331,13 +8223,6 @@
               </a:rPr>
               <a:t> reset --hard &lt;commit&gt;</a:t>
             </a:r>
-            <a:endParaRPr lang="en-US" dirty="0">
-              <a:solidFill>
-                <a:schemeClr val="bg1">
-                  <a:lumMod val="50000"/>
-                </a:schemeClr>
-              </a:solidFill>
-            </a:endParaRPr>
           </a:p>
         </p:txBody>
       </p:sp>
@@ -8502,15 +8387,7 @@
           <a:p>
             <a:r>
               <a:rPr lang="en-US" sz="1800" dirty="0"/>
-              <a:t>Move the current branch tip backward to </a:t>
-            </a:r>
-            <a:r>
-              <a:rPr lang="en-US" sz="1800" dirty="0"/>
-              <a:t>&lt;commit&gt;</a:t>
-            </a:r>
-            <a:r>
-              <a:rPr lang="en-US" sz="1800" dirty="0"/>
-              <a:t> and reset both the staging area and the working directory to match. </a:t>
+              <a:t>Move the current branch tip backward to &lt;commit&gt; and reset both the staging area and the working directory to match. </a:t>
             </a:r>
             <a:endParaRPr lang="en-US" sz="1800" dirty="0" smtClean="0"/>
           </a:p>
@@ -8521,17 +8398,8 @@
             </a:r>
             <a:r>
               <a:rPr lang="en-US" sz="1800" dirty="0"/>
-              <a:t>obliterates not only the uncommitted changes, but all commits after </a:t>
-            </a:r>
-            <a:r>
-              <a:rPr lang="en-US" sz="1800" dirty="0"/>
-              <a:t>&lt;commit&gt;</a:t>
-            </a:r>
-            <a:r>
-              <a:rPr lang="en-US" sz="1800" dirty="0"/>
-              <a:t>, as well.</a:t>
-            </a:r>
-            <a:endParaRPr lang="en-US" sz="1800" dirty="0"/>
+              <a:t>obliterates not only the uncommitted changes, but all commits after &lt;commit&gt;, as well.</a:t>
+            </a:r>
           </a:p>
         </p:txBody>
       </p:sp>
@@ -8622,15 +8490,7 @@
           <a:p>
             <a:r>
               <a:rPr lang="en-US" sz="1800" dirty="0"/>
-              <a:t>All of the above invocations are used to remove changes from a repository. Without the </a:t>
-            </a:r>
-            <a:r>
-              <a:rPr lang="en-US" sz="1800" dirty="0"/>
-              <a:t>--hard</a:t>
-            </a:r>
-            <a:r>
-              <a:rPr lang="en-US" sz="1800" dirty="0"/>
-              <a:t> flag, </a:t>
+              <a:t>All of the above invocations are used to remove changes from a repository. Without the --hard flag, </a:t>
             </a:r>
             <a:r>
               <a:rPr lang="en-US" sz="1800" dirty="0" err="1"/>
@@ -8638,11 +8498,7 @@
             </a:r>
             <a:r>
               <a:rPr lang="en-US" sz="1800" dirty="0"/>
-              <a:t> reset</a:t>
-            </a:r>
-            <a:r>
-              <a:rPr lang="en-US" sz="1800" dirty="0"/>
-              <a:t> is a way to clean up a repository by </a:t>
+              <a:t> reset is a way to clean up a repository by </a:t>
             </a:r>
             <a:r>
               <a:rPr lang="en-US" sz="1800" dirty="0" err="1"/>
@@ -8658,15 +8514,7 @@
             </a:r>
             <a:r>
               <a:rPr lang="en-US" sz="1800" dirty="0"/>
-              <a:t> a series of snapshots and re-building them from scratch. The </a:t>
-            </a:r>
-            <a:r>
-              <a:rPr lang="en-US" sz="1800" dirty="0"/>
-              <a:t>--hard</a:t>
-            </a:r>
-            <a:r>
-              <a:rPr lang="en-US" sz="1800" dirty="0"/>
-              <a:t> flag comes in handy when an experiment has gone horribly wrong and you need a clean slate to work with</a:t>
+              <a:t> a series of snapshots and re-building them from scratch. The --hard flag comes in handy when an experiment has gone horribly wrong and you need a clean slate to work with</a:t>
             </a:r>
             <a:r>
               <a:rPr lang="en-US" sz="1800" dirty="0" smtClean="0"/>
@@ -8692,11 +8540,7 @@
             </a:r>
             <a:r>
               <a:rPr lang="en-US" sz="1800" dirty="0"/>
-              <a:t> reset</a:t>
-            </a:r>
-            <a:r>
-              <a:rPr lang="en-US" sz="1800" dirty="0"/>
-              <a:t> is designed to undo </a:t>
+              <a:t> reset is designed to undo </a:t>
             </a:r>
             <a:r>
               <a:rPr lang="en-US" sz="1800" i="1" dirty="0"/>
@@ -8736,7 +8580,6 @@
               <a:rPr lang="en-US" sz="1800" dirty="0"/>
               <a:t> and uses a new commit to apply the undo.</a:t>
             </a:r>
-            <a:endParaRPr lang="en-US" sz="1800" dirty="0"/>
           </a:p>
         </p:txBody>
       </p:sp>
@@ -8943,11 +8786,7 @@
             </a:r>
             <a:r>
               <a:rPr lang="en-US" sz="2000" dirty="0"/>
-              <a:t> reset &lt;commit&gt;</a:t>
-            </a:r>
-            <a:r>
-              <a:rPr lang="en-US" sz="2000" dirty="0"/>
-              <a:t> when any snapshots after&lt;commit&gt; have been pushed to a public repository. After publishing a commit, you have to assume that other developers are reliant upon it</a:t>
+              <a:t> reset &lt;commit&gt; when any snapshots after&lt;commit&gt; have been pushed to a public repository. After publishing a commit, you have to assume that other developers are reliant upon it</a:t>
             </a:r>
             <a:r>
               <a:rPr lang="en-US" sz="2000" dirty="0" smtClean="0"/>
@@ -8968,15 +8807,7 @@
             </a:r>
             <a:r>
               <a:rPr lang="en-US" sz="2000" dirty="0"/>
-              <a:t> </a:t>
-            </a:r>
-            <a:r>
-              <a:rPr lang="en-US" sz="2000" dirty="0"/>
-              <a:t>origin/master</a:t>
-            </a:r>
-            <a:r>
-              <a:rPr lang="en-US" sz="2000" dirty="0"/>
-              <a:t> branch is the central repository’s version of </a:t>
+              <a:t> origin/master branch is the central repository’s version of </a:t>
             </a:r>
             <a:r>
               <a:rPr lang="en-US" sz="2000" dirty="0" smtClean="0"/>
@@ -8984,21 +8815,12 @@
             </a:r>
             <a:r>
               <a:rPr lang="en-US" sz="2000" dirty="0"/>
-              <a:t> </a:t>
-            </a:r>
-            <a:r>
-              <a:rPr lang="en-US" sz="2000" dirty="0"/>
-              <a:t>master</a:t>
-            </a:r>
-            <a:r>
-              <a:rPr lang="en-US" sz="2000" dirty="0"/>
-              <a:t> branch</a:t>
+              <a:t> master branch</a:t>
             </a:r>
             <a:r>
               <a:rPr lang="en-US" dirty="0"/>
               <a:t>.</a:t>
             </a:r>
-            <a:endParaRPr lang="en-US" dirty="0"/>
           </a:p>
         </p:txBody>
       </p:sp>
@@ -9417,11 +9239,7 @@
             </a:r>
             <a:r>
               <a:rPr lang="en-US" sz="1800" dirty="0"/>
-              <a:t> reset</a:t>
-            </a:r>
-            <a:r>
-              <a:rPr lang="en-US" sz="1800" dirty="0"/>
-              <a:t> command is frequently encountered while preparing the staged snapshot. </a:t>
+              <a:t> reset command is frequently encountered while preparing the staged snapshot. </a:t>
             </a:r>
             <a:endParaRPr lang="en-US" sz="1800" dirty="0" smtClean="0"/>
           </a:p>
@@ -9432,25 +9250,8 @@
             </a:r>
             <a:r>
               <a:rPr lang="en-US" sz="1800" dirty="0"/>
-              <a:t>next example assumes you have two files called </a:t>
-            </a:r>
-            <a:r>
-              <a:rPr lang="en-US" sz="1800" dirty="0"/>
-              <a:t>hello.py</a:t>
-            </a:r>
-            <a:r>
-              <a:rPr lang="en-US" sz="1800" dirty="0"/>
-              <a:t> and </a:t>
-            </a:r>
-            <a:r>
-              <a:rPr lang="en-US" sz="1800" dirty="0"/>
-              <a:t>main.py</a:t>
-            </a:r>
-            <a:r>
-              <a:rPr lang="en-US" sz="1800" dirty="0"/>
-              <a:t> that you’ve already added to the repository.</a:t>
-            </a:r>
-            <a:endParaRPr lang="en-US" sz="1800" dirty="0"/>
+              <a:t>next example assumes you have two files called hello.py and main.py that you’ve already added to the repository.</a:t>
+            </a:r>
           </a:p>
         </p:txBody>
       </p:sp>
@@ -9618,11 +9419,7 @@
             </a:r>
             <a:r>
               <a:rPr lang="en-US" sz="1800" dirty="0"/>
-              <a:t> reset</a:t>
-            </a:r>
-            <a:r>
-              <a:rPr lang="en-US" sz="1800" dirty="0"/>
-              <a:t> command is frequently encountered while preparing the staged snapshot. </a:t>
+              <a:t> reset command is frequently encountered while preparing the staged snapshot. </a:t>
             </a:r>
             <a:endParaRPr lang="en-US" sz="1800" dirty="0" smtClean="0"/>
           </a:p>
@@ -9633,25 +9430,8 @@
             </a:r>
             <a:r>
               <a:rPr lang="en-US" sz="1800" dirty="0"/>
-              <a:t>next example assumes you have two files called </a:t>
-            </a:r>
-            <a:r>
-              <a:rPr lang="en-US" sz="1800" dirty="0"/>
-              <a:t>hello.py</a:t>
-            </a:r>
-            <a:r>
-              <a:rPr lang="en-US" sz="1800" dirty="0"/>
-              <a:t> and </a:t>
-            </a:r>
-            <a:r>
-              <a:rPr lang="en-US" sz="1800" dirty="0"/>
-              <a:t>main.py</a:t>
-            </a:r>
-            <a:r>
-              <a:rPr lang="en-US" sz="1800" dirty="0"/>
-              <a:t> that you’ve already added to the repository.</a:t>
-            </a:r>
-            <a:endParaRPr lang="en-US" sz="1800" dirty="0"/>
+              <a:t>next example assumes you have two files called hello.py and main.py that you’ve already added to the repository.</a:t>
+            </a:r>
           </a:p>
         </p:txBody>
       </p:sp>
@@ -9878,11 +9658,7 @@
             </a:r>
             <a:r>
               <a:rPr lang="en-US" sz="1800" dirty="0"/>
-              <a:t> reset</a:t>
-            </a:r>
-            <a:r>
-              <a:rPr lang="en-US" sz="1800" dirty="0"/>
-              <a:t> helps you keep your commits highly-focused by letting you </a:t>
+              <a:t> reset helps you keep your commits highly-focused by letting you </a:t>
             </a:r>
             <a:r>
               <a:rPr lang="en-US" sz="1800" dirty="0" err="1"/>
@@ -9892,7 +9668,6 @@
               <a:rPr lang="en-US" sz="1800" dirty="0"/>
               <a:t> changes that aren’t related to the next commit.</a:t>
             </a:r>
-            <a:endParaRPr lang="en-US" sz="1800" dirty="0"/>
           </a:p>
         </p:txBody>
       </p:sp>
@@ -9991,11 +9766,7 @@
             </a:r>
             <a:r>
               <a:rPr lang="en-US" sz="1800" dirty="0"/>
-              <a:t> clean</a:t>
-            </a:r>
-            <a:r>
-              <a:rPr lang="en-US" sz="1800" dirty="0"/>
-              <a:t> command removes untracked files from your working directory. This is really more of a convenience command, since it’s trivial to see which files are untracked with </a:t>
+              <a:t> clean command removes untracked files from your working directory. This is really more of a convenience command, since it’s trivial to see which files are untracked with </a:t>
             </a:r>
             <a:r>
               <a:rPr lang="en-US" sz="1800" dirty="0" err="1"/>
@@ -10003,11 +9774,7 @@
             </a:r>
             <a:r>
               <a:rPr lang="en-US" sz="1800" dirty="0"/>
-              <a:t> status</a:t>
-            </a:r>
-            <a:r>
-              <a:rPr lang="en-US" sz="1800" dirty="0"/>
-              <a:t> and remove them manually. Like an ordinary </a:t>
+              <a:t> status and remove them manually. Like an ordinary </a:t>
             </a:r>
             <a:r>
               <a:rPr lang="en-US" sz="1800" dirty="0" err="1"/>
@@ -10023,11 +9790,7 @@
             </a:r>
             <a:r>
               <a:rPr lang="en-US" sz="1800" dirty="0"/>
-              <a:t> clean</a:t>
-            </a:r>
-            <a:r>
-              <a:rPr lang="en-US" sz="1800" dirty="0"/>
-              <a:t> is </a:t>
+              <a:t> clean is </a:t>
             </a:r>
             <a:r>
               <a:rPr lang="en-US" sz="1800" i="1" dirty="0" smtClean="0"/>
@@ -10057,11 +9820,7 @@
             </a:r>
             <a:r>
               <a:rPr lang="en-US" sz="1800" dirty="0"/>
-              <a:t> clean</a:t>
-            </a:r>
-            <a:r>
-              <a:rPr lang="en-US" sz="1800" dirty="0"/>
-              <a:t> command is often executed in conjunction with </a:t>
+              <a:t> clean command is often executed in conjunction with </a:t>
             </a:r>
             <a:r>
               <a:rPr lang="en-US" sz="1800" dirty="0" err="1"/>
@@ -10069,11 +9828,7 @@
             </a:r>
             <a:r>
               <a:rPr lang="en-US" sz="1800" dirty="0"/>
-              <a:t> reset --hard</a:t>
-            </a:r>
-            <a:r>
-              <a:rPr lang="en-US" sz="1800" dirty="0"/>
-              <a:t>. Remember that resetting only affects tracked files, so a separate command is required for cleaning up untracked ones. Combined, these two commands let you return the working directory to the exact state of a particular commit</a:t>
+              <a:t> reset --hard. Remember that resetting only affects tracked files, so a separate command is required for cleaning up untracked ones. Combined, these two commands let you return the working directory to the exact state of a particular commit</a:t>
             </a:r>
             <a:r>
               <a:rPr lang="en-US" sz="1800" dirty="0" smtClean="0"/>
@@ -10187,7 +9942,6 @@
               <a:rPr lang="en-US" sz="1800" dirty="0"/>
               <a:t> clean. This will show you which files are going to be removed without actually doing it.</a:t>
             </a:r>
-            <a:endParaRPr lang="en-US" sz="1800" dirty="0"/>
           </a:p>
         </p:txBody>
       </p:sp>
@@ -10238,13 +9992,6 @@
               </a:rPr>
               <a:t> clean -n</a:t>
             </a:r>
-            <a:endParaRPr lang="en-US" dirty="0">
-              <a:solidFill>
-                <a:schemeClr val="bg1">
-                  <a:lumMod val="50000"/>
-                </a:schemeClr>
-              </a:solidFill>
-            </a:endParaRPr>
           </a:p>
         </p:txBody>
       </p:sp>
@@ -10295,13 +10042,6 @@
               </a:rPr>
               <a:t> clean -f</a:t>
             </a:r>
-            <a:endParaRPr lang="en-US" dirty="0">
-              <a:solidFill>
-                <a:schemeClr val="bg1">
-                  <a:lumMod val="50000"/>
-                </a:schemeClr>
-              </a:solidFill>
-            </a:endParaRPr>
           </a:p>
         </p:txBody>
       </p:sp>
@@ -10466,15 +10206,7 @@
           <a:p>
             <a:r>
               <a:rPr lang="en-US" sz="1800" dirty="0"/>
-              <a:t>Remove untracked files from the current directory. The </a:t>
-            </a:r>
-            <a:r>
-              <a:rPr lang="en-US" sz="1800" dirty="0"/>
-              <a:t>-f</a:t>
-            </a:r>
-            <a:r>
-              <a:rPr lang="en-US" sz="1800" dirty="0"/>
-              <a:t> (force) flag is required unless the </a:t>
+              <a:t>Remove untracked files from the current directory. The -f (force) flag is required unless the </a:t>
             </a:r>
             <a:r>
               <a:rPr lang="en-US" sz="1800" dirty="0" err="1"/>
@@ -10482,23 +10214,7 @@
             </a:r>
             <a:r>
               <a:rPr lang="en-US" sz="1800" dirty="0"/>
-              <a:t> configuration option is set to </a:t>
-            </a:r>
-            <a:r>
-              <a:rPr lang="en-US" sz="1800" dirty="0"/>
-              <a:t>false</a:t>
-            </a:r>
-            <a:r>
-              <a:rPr lang="en-US" sz="1800" dirty="0"/>
-              <a:t> (it's </a:t>
-            </a:r>
-            <a:r>
-              <a:rPr lang="en-US" sz="1800" dirty="0"/>
-              <a:t>true</a:t>
-            </a:r>
-            <a:r>
-              <a:rPr lang="en-US" sz="1800" dirty="0"/>
-              <a:t> by default). This will </a:t>
+              <a:t> configuration option is set to false (it's true by default). This will </a:t>
             </a:r>
             <a:r>
               <a:rPr lang="en-US" sz="1800" i="1" dirty="0"/>
@@ -10506,11 +10222,7 @@
             </a:r>
             <a:r>
               <a:rPr lang="en-US" sz="1800" dirty="0"/>
-              <a:t> remove untracked folders or files specified by </a:t>
-            </a:r>
-            <a:r>
-              <a:rPr lang="en-US" sz="1800" dirty="0"/>
-              <a:t>.</a:t>
+              <a:t> remove untracked folders or files specified by .</a:t>
             </a:r>
             <a:r>
               <a:rPr lang="en-US" sz="1800" dirty="0" err="1"/>
@@ -10753,7 +10465,6 @@
               <a:rPr lang="en-US" sz="1800" dirty="0"/>
               <a:t>Remove untracked files, but limit the operation to the specified path.</a:t>
             </a:r>
-            <a:endParaRPr lang="en-US" sz="1800" dirty="0"/>
           </a:p>
         </p:txBody>
       </p:sp>
@@ -10995,7 +10706,6 @@
               <a:rPr lang="en-US" sz="1800" dirty="0"/>
               <a:t> untracked directories from the current directory.</a:t>
             </a:r>
-            <a:endParaRPr lang="en-US" sz="1800" dirty="0"/>
           </a:p>
         </p:txBody>
       </p:sp>
@@ -11247,7 +10957,6 @@
               <a:rPr lang="en-US" sz="1800" dirty="0"/>
               <a:t> usually ignores.</a:t>
             </a:r>
-            <a:endParaRPr lang="en-US" sz="1800" dirty="0"/>
           </a:p>
         </p:txBody>
       </p:sp>
@@ -11346,11 +11055,7 @@
             </a:r>
             <a:r>
               <a:rPr lang="en-US" dirty="0"/>
-              <a:t> reset --hard</a:t>
-            </a:r>
-            <a:r>
-              <a:rPr lang="en-US" dirty="0"/>
-              <a:t> and </a:t>
+              <a:t> reset --hard and </a:t>
             </a:r>
             <a:r>
               <a:rPr lang="en-US" dirty="0" err="1"/>
@@ -11358,11 +11063,7 @@
             </a:r>
             <a:r>
               <a:rPr lang="en-US" dirty="0"/>
-              <a:t> clean -f</a:t>
-            </a:r>
-            <a:r>
-              <a:rPr lang="en-US" dirty="0"/>
-              <a:t> commands are your best friends after you’ve made some embarrassing developments in your local repository and want to burn the evidence. Running both of them will make your working directory match the most recent commit, giving you a clean slate to work with</a:t>
+              <a:t> clean -f commands are your best friends after you’ve made some embarrassing developments in your local repository and want to burn the evidence. Running both of them will make your working directory match the most recent commit, giving you a clean slate to work with</a:t>
             </a:r>
             <a:r>
               <a:rPr lang="en-US" dirty="0" smtClean="0"/>
@@ -11380,39 +11081,11 @@
             </a:r>
             <a:r>
               <a:rPr lang="en-US" dirty="0"/>
-              <a:t> clean</a:t>
-            </a:r>
-            <a:r>
-              <a:rPr lang="en-US" dirty="0"/>
-              <a:t> command can also be useful for cleaning up the working directory after a build. For example, it can easily remove the </a:t>
-            </a:r>
-            <a:r>
-              <a:rPr lang="en-US" dirty="0"/>
-              <a:t>.o</a:t>
-            </a:r>
-            <a:r>
-              <a:rPr lang="en-US" dirty="0"/>
-              <a:t> and </a:t>
-            </a:r>
-            <a:r>
-              <a:rPr lang="en-US" dirty="0"/>
-              <a:t>.exe</a:t>
-            </a:r>
-            <a:r>
-              <a:rPr lang="en-US" dirty="0"/>
-              <a:t> binaries generated by a C compiler. This is occasionally a necessary step before packaging a project for release. The </a:t>
-            </a:r>
-            <a:r>
-              <a:rPr lang="en-US" dirty="0"/>
-              <a:t>-</a:t>
+              <a:t> clean command can also be useful for cleaning up the working directory after a build. For example, it can easily remove the .o and .exe binaries generated by a C compiler. This is occasionally a necessary step before packaging a project for release. The -</a:t>
             </a:r>
             <a:r>
               <a:rPr lang="en-US" dirty="0" err="1"/>
-              <a:t>x</a:t>
-            </a:r>
-            <a:r>
-              <a:rPr lang="en-US" dirty="0" err="1"/>
-              <a:t>option</a:t>
+              <a:t>xoption</a:t>
             </a:r>
             <a:r>
               <a:rPr lang="en-US" dirty="0"/>
@@ -11434,11 +11107,7 @@
             </a:r>
             <a:r>
               <a:rPr lang="en-US" dirty="0"/>
-              <a:t> reset</a:t>
-            </a:r>
-            <a:r>
-              <a:rPr lang="en-US" dirty="0"/>
-              <a:t>, </a:t>
+              <a:t> reset, </a:t>
             </a:r>
             <a:r>
               <a:rPr lang="en-US" dirty="0" err="1"/>
@@ -11446,11 +11115,7 @@
             </a:r>
             <a:r>
               <a:rPr lang="en-US" dirty="0"/>
-              <a:t> clean</a:t>
-            </a:r>
-            <a:r>
-              <a:rPr lang="en-US" dirty="0"/>
-              <a:t> is one of the only </a:t>
+              <a:t> clean is one of the only </a:t>
             </a:r>
             <a:r>
               <a:rPr lang="en-US" dirty="0" err="1"/>
@@ -11474,15 +11139,7 @@
             </a:r>
             <a:r>
               <a:rPr lang="en-US" dirty="0"/>
-              <a:t> the </a:t>
-            </a:r>
-            <a:r>
-              <a:rPr lang="en-US" dirty="0"/>
-              <a:t>-f</a:t>
-            </a:r>
-            <a:r>
-              <a:rPr lang="en-US" dirty="0"/>
-              <a:t> flag for even the most basic operations. This prevents you from accidentally deleting everything with a naive </a:t>
+              <a:t> the -f flag for even the most basic operations. This prevents you from accidentally deleting everything with a naive </a:t>
             </a:r>
             <a:r>
               <a:rPr lang="en-US" dirty="0" err="1"/>
@@ -11490,13 +11147,8 @@
             </a:r>
             <a:r>
               <a:rPr lang="en-US" dirty="0"/>
-              <a:t> clean</a:t>
-            </a:r>
-            <a:r>
-              <a:rPr lang="en-US" dirty="0"/>
-              <a:t> call.</a:t>
-            </a:r>
-            <a:endParaRPr lang="en-US" dirty="0"/>
+              <a:t> clean call.</a:t>
+            </a:r>
           </a:p>
         </p:txBody>
       </p:sp>
@@ -11594,7 +11246,6 @@
               <a:rPr lang="en-US" sz="1800" dirty="0"/>
               <a:t>The following example obliterates all changes in the working directory, including new files that have been added. It assumes you’ve already committed a few snapshots and are experimenting with some new developments.</a:t>
             </a:r>
-            <a:endParaRPr lang="en-US" sz="1800" dirty="0"/>
           </a:p>
         </p:txBody>
       </p:sp>
@@ -12127,6 +11778,185 @@
     <p:extLst>
       <p:ext uri="{BB962C8B-B14F-4D97-AF65-F5344CB8AC3E}">
         <p14:creationId xmlns:p14="http://schemas.microsoft.com/office/powerpoint/2010/main" val="2552632316"/>
+      </p:ext>
+    </p:extLst>
+  </p:cSld>
+  <p:clrMapOvr>
+    <a:masterClrMapping/>
+  </p:clrMapOvr>
+  <p:timing>
+    <p:tnLst>
+      <p:par>
+        <p:cTn id="1" dur="indefinite" restart="never" nodeType="tmRoot"/>
+      </p:par>
+    </p:tnLst>
+  </p:timing>
+</p:sld>
+</file>
+
+<file path=ppt/slides/slide121.xml><?xml version="1.0" encoding="utf-8"?>
+<p:sld xmlns:a="http://schemas.openxmlformats.org/drawingml/2006/main" xmlns:r="http://schemas.openxmlformats.org/officeDocument/2006/relationships" xmlns:p="http://schemas.openxmlformats.org/presentationml/2006/main">
+  <p:cSld>
+    <p:spTree>
+      <p:nvGrpSpPr>
+        <p:cNvPr id="1" name=""/>
+        <p:cNvGrpSpPr/>
+        <p:nvPr/>
+      </p:nvGrpSpPr>
+      <p:grpSpPr>
+        <a:xfrm>
+          <a:off x="0" y="0"/>
+          <a:ext cx="0" cy="0"/>
+          <a:chOff x="0" y="0"/>
+          <a:chExt cx="0" cy="0"/>
+        </a:xfrm>
+      </p:grpSpPr>
+      <p:sp>
+        <p:nvSpPr>
+          <p:cNvPr id="4" name="Title 3"/>
+          <p:cNvSpPr>
+            <a:spLocks noGrp="1"/>
+          </p:cNvSpPr>
+          <p:nvPr>
+            <p:ph type="ctrTitle"/>
+          </p:nvPr>
+        </p:nvSpPr>
+        <p:spPr/>
+        <p:txBody>
+          <a:bodyPr/>
+          <a:lstStyle/>
+          <a:p>
+            <a:r>
+              <a:rPr lang="en-US" dirty="0" err="1" smtClean="0"/>
+              <a:t>Git</a:t>
+            </a:r>
+            <a:r>
+              <a:rPr lang="en-US" dirty="0" smtClean="0"/>
+              <a:t> Hub</a:t>
+            </a:r>
+            <a:endParaRPr lang="en-US" dirty="0"/>
+          </a:p>
+        </p:txBody>
+      </p:sp>
+      <p:sp>
+        <p:nvSpPr>
+          <p:cNvPr id="5" name="Subtitle 4"/>
+          <p:cNvSpPr>
+            <a:spLocks noGrp="1"/>
+          </p:cNvSpPr>
+          <p:nvPr>
+            <p:ph type="subTitle" idx="1"/>
+          </p:nvPr>
+        </p:nvSpPr>
+        <p:spPr/>
+        <p:txBody>
+          <a:bodyPr/>
+          <a:lstStyle/>
+          <a:p>
+            <a:endParaRPr lang="en-US"/>
+          </a:p>
+        </p:txBody>
+      </p:sp>
+    </p:spTree>
+    <p:extLst>
+      <p:ext uri="{BB962C8B-B14F-4D97-AF65-F5344CB8AC3E}">
+        <p14:creationId xmlns:p14="http://schemas.microsoft.com/office/powerpoint/2010/main" val="3394830411"/>
+      </p:ext>
+    </p:extLst>
+  </p:cSld>
+  <p:clrMapOvr>
+    <a:masterClrMapping/>
+  </p:clrMapOvr>
+  <p:timing>
+    <p:tnLst>
+      <p:par>
+        <p:cTn id="1" dur="indefinite" restart="never" nodeType="tmRoot"/>
+      </p:par>
+    </p:tnLst>
+  </p:timing>
+</p:sld>
+</file>
+
+<file path=ppt/slides/slide122.xml><?xml version="1.0" encoding="utf-8"?>
+<p:sld xmlns:a="http://schemas.openxmlformats.org/drawingml/2006/main" xmlns:r="http://schemas.openxmlformats.org/officeDocument/2006/relationships" xmlns:p="http://schemas.openxmlformats.org/presentationml/2006/main">
+  <p:cSld>
+    <p:spTree>
+      <p:nvGrpSpPr>
+        <p:cNvPr id="1" name=""/>
+        <p:cNvGrpSpPr/>
+        <p:nvPr/>
+      </p:nvGrpSpPr>
+      <p:grpSpPr>
+        <a:xfrm>
+          <a:off x="0" y="0"/>
+          <a:ext cx="0" cy="0"/>
+          <a:chOff x="0" y="0"/>
+          <a:chExt cx="0" cy="0"/>
+        </a:xfrm>
+      </p:grpSpPr>
+      <p:sp>
+        <p:nvSpPr>
+          <p:cNvPr id="2" name="Title 1"/>
+          <p:cNvSpPr>
+            <a:spLocks noGrp="1"/>
+          </p:cNvSpPr>
+          <p:nvPr>
+            <p:ph type="title"/>
+          </p:nvPr>
+        </p:nvSpPr>
+        <p:spPr/>
+        <p:txBody>
+          <a:bodyPr>
+            <a:normAutofit fontScale="90000"/>
+          </a:bodyPr>
+          <a:lstStyle/>
+          <a:p>
+            <a:r>
+              <a:rPr lang="en-US" dirty="0"/>
+              <a:t>Adding an existing project to </a:t>
+            </a:r>
+            <a:r>
+              <a:rPr lang="en-US" dirty="0" err="1"/>
+              <a:t>GitHub</a:t>
+            </a:r>
+            <a:r>
+              <a:rPr lang="en-US" dirty="0"/>
+              <a:t> using the command </a:t>
+            </a:r>
+            <a:r>
+              <a:rPr lang="en-US" dirty="0" smtClean="0"/>
+              <a:t>line</a:t>
+            </a:r>
+            <a:endParaRPr lang="en-US" dirty="0"/>
+          </a:p>
+        </p:txBody>
+      </p:sp>
+      <p:sp>
+        <p:nvSpPr>
+          <p:cNvPr id="3" name="Content Placeholder 2"/>
+          <p:cNvSpPr>
+            <a:spLocks noGrp="1"/>
+          </p:cNvSpPr>
+          <p:nvPr>
+            <p:ph idx="1"/>
+          </p:nvPr>
+        </p:nvSpPr>
+        <p:spPr/>
+        <p:txBody>
+          <a:bodyPr/>
+          <a:lstStyle/>
+          <a:p>
+            <a:r>
+              <a:rPr lang="en-US" dirty="0"/>
+              <a:t>https://help.github.com/articles/adding-an-existing-project-to-github-using-the-command-line/</a:t>
+            </a:r>
+          </a:p>
+        </p:txBody>
+      </p:sp>
+    </p:spTree>
+    <p:extLst>
+      <p:ext uri="{BB962C8B-B14F-4D97-AF65-F5344CB8AC3E}">
+        <p14:creationId xmlns:p14="http://schemas.microsoft.com/office/powerpoint/2010/main" val="451648042"/>
       </p:ext>
     </p:extLst>
   </p:cSld>
@@ -18440,15 +18270,7 @@
                   <a:srgbClr val="FF0000"/>
                 </a:solidFill>
               </a:rPr>
-              <a:t>??? Wha</a:t>
-            </a:r>
-            <a:r>
-              <a:rPr lang="en-US" dirty="0" smtClean="0">
-                <a:solidFill>
-                  <a:srgbClr val="FF0000"/>
-                </a:solidFill>
-              </a:rPr>
-              <a:t>t about adding and deleting directories?</a:t>
+              <a:t>??? What about adding and deleting directories?</a:t>
             </a:r>
             <a:endParaRPr lang="en-US" dirty="0">
               <a:solidFill>
@@ -19506,11 +19328,7 @@
             </a:r>
             <a:r>
               <a:rPr lang="en-US" sz="2000" dirty="0" smtClean="0"/>
-              <a:t>otice that the prompt is changed to note that we are in a bare repository</a:t>
-            </a:r>
-            <a:r>
-              <a:rPr lang="en-US" sz="2000" dirty="0" smtClean="0"/>
-              <a:t>.</a:t>
+              <a:t>otice that the prompt is changed to note that we are in a bare repository.</a:t>
             </a:r>
           </a:p>
           <a:p>
@@ -31834,13 +31652,6 @@
               </a:rPr>
               <a:t> log --author="&lt;pattern&gt;"</a:t>
             </a:r>
-            <a:endParaRPr lang="en-US" dirty="0">
-              <a:solidFill>
-                <a:schemeClr val="bg1">
-                  <a:lumMod val="50000"/>
-                </a:schemeClr>
-              </a:solidFill>
-            </a:endParaRPr>
           </a:p>
         </p:txBody>
       </p:sp>
@@ -32005,17 +31816,8 @@
           <a:p>
             <a:r>
               <a:rPr lang="en-US" sz="1800" dirty="0"/>
-              <a:t>Search for commits by a particular author. The </a:t>
-            </a:r>
-            <a:r>
-              <a:rPr lang="en-US" sz="1800" dirty="0"/>
-              <a:t>&lt;pattern&gt;</a:t>
-            </a:r>
-            <a:r>
-              <a:rPr lang="en-US" sz="1800" dirty="0"/>
-              <a:t> argument can be a plain string or a regular expression.</a:t>
-            </a:r>
-            <a:endParaRPr lang="en-US" sz="1800" dirty="0"/>
+              <a:t>Search for commits by a particular author. The &lt;pattern&gt; argument can be a plain string or a regular expression.</a:t>
+            </a:r>
           </a:p>
         </p:txBody>
       </p:sp>
@@ -32086,13 +31888,6 @@
               </a:rPr>
               <a:t>="&lt;pattern&gt;"</a:t>
             </a:r>
-            <a:endParaRPr lang="en-US" dirty="0">
-              <a:solidFill>
-                <a:schemeClr val="bg1">
-                  <a:lumMod val="50000"/>
-                </a:schemeClr>
-              </a:solidFill>
-            </a:endParaRPr>
           </a:p>
         </p:txBody>
       </p:sp>
@@ -32261,17 +32056,8 @@
             </a:r>
             <a:r>
               <a:rPr lang="en-US" sz="1800" dirty="0"/>
-              <a:t>for commits with a commit message that matches </a:t>
-            </a:r>
-            <a:r>
-              <a:rPr lang="en-US" sz="1800" dirty="0"/>
-              <a:t>&lt;pattern&gt;</a:t>
-            </a:r>
-            <a:r>
-              <a:rPr lang="en-US" sz="1800" dirty="0"/>
-              <a:t>, which can be a plain string or a regular expression.</a:t>
-            </a:r>
-            <a:endParaRPr lang="en-US" sz="1800" dirty="0"/>
+              <a:t>for commits with a commit message that matches &lt;pattern&gt;, which can be a plain string or a regular expression.</a:t>
+            </a:r>
           </a:p>
         </p:txBody>
       </p:sp>
@@ -32322,13 +32108,6 @@
               </a:rPr>
               <a:t> log &lt;since&gt;..&lt;until&gt;</a:t>
             </a:r>
-            <a:endParaRPr lang="en-US" dirty="0">
-              <a:solidFill>
-                <a:schemeClr val="bg1">
-                  <a:lumMod val="50000"/>
-                </a:schemeClr>
-              </a:solidFill>
-            </a:endParaRPr>
           </a:p>
         </p:txBody>
       </p:sp>
@@ -32493,31 +32272,7 @@
           <a:p>
             <a:r>
               <a:rPr lang="en-US" sz="1800" dirty="0"/>
-              <a:t>Show only commits that occur between </a:t>
-            </a:r>
-            <a:r>
-              <a:rPr lang="en-US" sz="1800" dirty="0"/>
-              <a:t>&lt;since&gt;</a:t>
-            </a:r>
-            <a:r>
-              <a:rPr lang="en-US" sz="1800" dirty="0"/>
-              <a:t> and </a:t>
-            </a:r>
-            <a:r>
-              <a:rPr lang="en-US" sz="1800" dirty="0"/>
-              <a:t>&lt;until&gt;</a:t>
-            </a:r>
-            <a:r>
-              <a:rPr lang="en-US" sz="1800" dirty="0"/>
-              <a:t>. Both arguments can be either a commit ID, a branch name, </a:t>
-            </a:r>
-            <a:r>
-              <a:rPr lang="en-US" sz="1800" dirty="0"/>
-              <a:t>HEAD</a:t>
-            </a:r>
-            <a:r>
-              <a:rPr lang="en-US" sz="1800" dirty="0"/>
-              <a:t>, or any other kind of </a:t>
+              <a:t>Show only commits that occur between &lt;since&gt; and &lt;until&gt;. Both arguments can be either a commit ID, a branch name, HEAD, or any other kind of </a:t>
             </a:r>
             <a:r>
               <a:rPr lang="en-US" sz="1800" dirty="0">
@@ -32529,7 +32284,6 @@
               <a:rPr lang="en-US" sz="1800" dirty="0"/>
               <a:t>.</a:t>
             </a:r>
-            <a:endParaRPr lang="en-US" sz="1800" dirty="0"/>
           </a:p>
         </p:txBody>
       </p:sp>
@@ -32763,7 +32517,6 @@
               <a:rPr lang="en-US" sz="1800" dirty="0"/>
               <a:t>Only display commits that include the specified file. This is an easy way to see the history of a particular file.</a:t>
             </a:r>
-            <a:endParaRPr lang="en-US" sz="1800" dirty="0"/>
           </a:p>
         </p:txBody>
       </p:sp>
@@ -33005,7 +32758,6 @@
               <a:rPr lang="en-US" sz="1800" dirty="0"/>
               <a:t> shows the commit information on a single line making it easier to browse through commits at-a-glance.</a:t>
             </a:r>
-            <a:endParaRPr lang="en-US" sz="1800" dirty="0"/>
           </a:p>
         </p:txBody>
       </p:sp>
@@ -34107,13 +33859,6 @@
               </a:rPr>
               <a:t> checkout master</a:t>
             </a:r>
-            <a:endParaRPr lang="en-US" dirty="0">
-              <a:solidFill>
-                <a:schemeClr val="bg1">
-                  <a:lumMod val="50000"/>
-                </a:schemeClr>
-              </a:solidFill>
-            </a:endParaRPr>
           </a:p>
         </p:txBody>
       </p:sp>
@@ -34280,7 +34025,6 @@
               <a:rPr lang="en-US" sz="1800" dirty="0"/>
               <a:t>Return to the master branch. Branches are covered in depth in the next module, but for now, you can just think of this as a way to get back to the “current” state of the project.</a:t>
             </a:r>
-            <a:endParaRPr lang="en-US" sz="1800" dirty="0"/>
           </a:p>
         </p:txBody>
       </p:sp>
@@ -34378,23 +34122,7 @@
           <a:p>
             <a:r>
               <a:rPr lang="en-US" sz="1800" dirty="0"/>
-              <a:t>Check out a previous version of a file. This turns the </a:t>
-            </a:r>
-            <a:r>
-              <a:rPr lang="en-US" sz="1800" dirty="0"/>
-              <a:t>&lt;file&gt;</a:t>
-            </a:r>
-            <a:r>
-              <a:rPr lang="en-US" sz="1800" dirty="0"/>
-              <a:t> that resides in the working directory into an exact copy of the one from </a:t>
-            </a:r>
-            <a:r>
-              <a:rPr lang="en-US" sz="1800" dirty="0"/>
-              <a:t>&lt;commit&gt;</a:t>
-            </a:r>
-            <a:r>
-              <a:rPr lang="en-US" sz="1800" dirty="0"/>
-              <a:t> and adds it to the staging area</a:t>
+              <a:t>Check out a previous version of a file. This turns the &lt;file&gt; that resides in the working directory into an exact copy of the one from &lt;commit&gt; and adds it to the staging area</a:t>
             </a:r>
             <a:r>
               <a:rPr lang="en-US" sz="1800" dirty="0" smtClean="0"/>
@@ -34456,13 +34184,6 @@
               </a:rPr>
               <a:t> checkout &lt;commit&gt; &lt;file&gt;</a:t>
             </a:r>
-            <a:endParaRPr lang="en-US" dirty="0">
-              <a:solidFill>
-                <a:schemeClr val="bg1">
-                  <a:lumMod val="50000"/>
-                </a:schemeClr>
-              </a:solidFill>
-            </a:endParaRPr>
           </a:p>
         </p:txBody>
       </p:sp>
@@ -34627,17 +34348,8 @@
           <a:p>
             <a:r>
               <a:rPr lang="en-US" sz="1800" dirty="0"/>
-              <a:t>Update all files in the working directory to match the specified commit. You can use either a commit hash or a tag as the </a:t>
-            </a:r>
-            <a:r>
-              <a:rPr lang="en-US" sz="1800" dirty="0"/>
-              <a:t>&lt;commit&gt;</a:t>
-            </a:r>
-            <a:r>
-              <a:rPr lang="en-US" sz="1800" dirty="0"/>
-              <a:t>argument. This will put you in a detached HEAD state.</a:t>
-            </a:r>
-            <a:endParaRPr lang="en-US" sz="1800" dirty="0"/>
+              <a:t>Update all files in the working directory to match the specified commit. You can use either a commit hash or a tag as the &lt;commit&gt;argument. This will put you in a detached HEAD state.</a:t>
+            </a:r>
           </a:p>
         </p:txBody>
       </p:sp>
@@ -34688,13 +34400,6 @@
               </a:rPr>
               <a:t> checkout &lt;commit&gt;</a:t>
             </a:r>
-            <a:endParaRPr lang="en-US" dirty="0">
-              <a:solidFill>
-                <a:schemeClr val="bg1">
-                  <a:lumMod val="50000"/>
-                </a:schemeClr>
-              </a:solidFill>
-            </a:endParaRPr>
           </a:p>
         </p:txBody>
       </p:sp>
@@ -34915,11 +34620,7 @@
             </a:r>
             <a:r>
               <a:rPr lang="en-US" dirty="0"/>
-              <a:t> checkout</a:t>
-            </a:r>
-            <a:r>
-              <a:rPr lang="en-US" dirty="0"/>
-              <a:t> is an easy way to “load” any of these saved snapshots onto your development machine</a:t>
+              <a:t> checkout is an easy way to “load” any of these saved snapshots onto your development machine</a:t>
             </a:r>
             <a:r>
               <a:rPr lang="en-US" dirty="0" smtClean="0"/>
@@ -34929,15 +34630,7 @@
           <a:p>
             <a:r>
               <a:rPr lang="en-US" dirty="0"/>
-              <a:t>Checking out an old commit is a read-only operation. It’s impossible to harm your repository while viewing an old revision. The “current” state of your project remains untouched in the </a:t>
-            </a:r>
-            <a:r>
-              <a:rPr lang="en-US" dirty="0"/>
-              <a:t>master</a:t>
-            </a:r>
-            <a:r>
-              <a:rPr lang="en-US" dirty="0"/>
-              <a:t> branch (see the </a:t>
+              <a:t>Checking out an old commit is a read-only operation. It’s impossible to harm your repository while viewing an old revision. The “current” state of your project remains untouched in the master branch (see the </a:t>
             </a:r>
             <a:r>
               <a:rPr lang="en-US" dirty="0">
@@ -34958,33 +34651,8 @@
             </a:r>
             <a:r>
               <a:rPr lang="en-US" dirty="0"/>
-              <a:t>the normal course of development, the </a:t>
-            </a:r>
-            <a:r>
-              <a:rPr lang="en-US" dirty="0"/>
-              <a:t>HEAD</a:t>
-            </a:r>
-            <a:r>
-              <a:rPr lang="en-US" dirty="0"/>
-              <a:t> usually points to master or some other local branch, but when you check out a previous commit, </a:t>
-            </a:r>
-            <a:r>
-              <a:rPr lang="en-US" dirty="0"/>
-              <a:t>HEAD</a:t>
-            </a:r>
-            <a:r>
-              <a:rPr lang="en-US" dirty="0"/>
-              <a:t> no longer points to a branch—it points directly to a commit. This is called a “detached </a:t>
-            </a:r>
-            <a:r>
-              <a:rPr lang="en-US" dirty="0"/>
-              <a:t>HEAD</a:t>
-            </a:r>
-            <a:r>
-              <a:rPr lang="en-US" dirty="0"/>
-              <a:t>” state, and it can be visualized as the following:</a:t>
-            </a:r>
-            <a:endParaRPr lang="en-US" dirty="0"/>
+              <a:t>the normal course of development, the HEAD usually points to master or some other local branch, but when you check out a previous commit, HEAD no longer points to a branch—it points directly to a commit. This is called a “detached HEAD” state, and it can be visualized as the following:</a:t>
+            </a:r>
           </a:p>
         </p:txBody>
       </p:sp>
@@ -35140,13 +34808,8 @@
             </a:r>
             <a:r>
               <a:rPr lang="en-US" dirty="0"/>
-              <a:t> checkout</a:t>
-            </a:r>
-            <a:r>
-              <a:rPr lang="en-US" dirty="0"/>
-              <a:t> serves as a way to revert back to an old version of an individual file.</a:t>
-            </a:r>
-            <a:endParaRPr lang="en-US" dirty="0"/>
+              <a:t> checkout serves as a way to revert back to an old version of an individual file.</a:t>
+            </a:r>
           </a:p>
         </p:txBody>
       </p:sp>
@@ -35378,7 +35041,6 @@
               <a:rPr lang="en-US" sz="1600" dirty="0"/>
               <a:t>This example assumes that you’ve started developing a crazy experiment, but you’re not sure if you want to keep it or not. To help you decide, you want to take a look at the state of the project before you started your experiment. First, you’ll need to find the ID of the revision you want to see.</a:t>
             </a:r>
-            <a:endParaRPr lang="en-US" sz="1600" dirty="0"/>
           </a:p>
         </p:txBody>
       </p:sp>
@@ -35599,7 +35261,6 @@
               <a:rPr lang="en-US" sz="1600" dirty="0"/>
               <a:t>Let’s say your project history looks something like the following:</a:t>
             </a:r>
-            <a:endParaRPr lang="en-US" sz="1600" dirty="0"/>
           </a:p>
         </p:txBody>
       </p:sp>
@@ -35925,13 +35586,8 @@
             </a:r>
             <a:r>
               <a:rPr lang="en-US" sz="1600" dirty="0"/>
-              <a:t> checkout</a:t>
-            </a:r>
-            <a:r>
-              <a:rPr lang="en-US" sz="1600" dirty="0"/>
-              <a:t> to view the “Make some import changes to hello.py” commit as follows:</a:t>
-            </a:r>
-            <a:endParaRPr lang="en-US" sz="1600" dirty="0"/>
+              <a:t> checkout to view the “Make some import changes to hello.py” commit as follows:</a:t>
+            </a:r>
           </a:p>
         </p:txBody>
       </p:sp>
@@ -36150,15 +35806,7 @@
           <a:p>
             <a:r>
               <a:rPr lang="en-US" sz="1600" dirty="0"/>
-              <a:t>This makes your working directory match the exact state of the </a:t>
-            </a:r>
-            <a:r>
-              <a:rPr lang="en-US" sz="1600" dirty="0"/>
-              <a:t>a1e8fb5</a:t>
-            </a:r>
-            <a:r>
-              <a:rPr lang="en-US" sz="1600" dirty="0"/>
-              <a:t> commit. You can look at files, compile the project, run tests, and even edit files without worrying about losing the current state of the project. </a:t>
+              <a:t>This makes your working directory match the exact state of the a1e8fb5 commit. You can look at files, compile the project, run tests, and even edit files without worrying about losing the current state of the project. </a:t>
             </a:r>
             <a:r>
               <a:rPr lang="en-US" sz="1600" i="1" dirty="0"/>
@@ -36168,7 +35816,6 @@
               <a:rPr lang="en-US" sz="1600" dirty="0"/>
               <a:t> you do in here will be saved in your repository. To continue developing, you need to get back to the “current” state of your project:</a:t>
             </a:r>
-            <a:endParaRPr lang="en-US" sz="1600" dirty="0"/>
           </a:p>
         </p:txBody>
       </p:sp>
@@ -36789,13 +36436,8 @@
             </a:r>
             <a:r>
               <a:rPr lang="en-US" sz="1600" dirty="0"/>
-              <a:t> checkout</a:t>
-            </a:r>
-            <a:r>
-              <a:rPr lang="en-US" sz="1600" dirty="0"/>
-              <a:t> to view the “Make some import changes to hello.py” commit as follows:</a:t>
-            </a:r>
-            <a:endParaRPr lang="en-US" sz="1600" dirty="0"/>
+              <a:t> checkout to view the “Make some import changes to hello.py” commit as follows:</a:t>
+            </a:r>
           </a:p>
         </p:txBody>
       </p:sp>
@@ -37014,15 +36656,7 @@
           <a:p>
             <a:r>
               <a:rPr lang="en-US" sz="1600" dirty="0"/>
-              <a:t>This makes your working directory match the exact state of the </a:t>
-            </a:r>
-            <a:r>
-              <a:rPr lang="en-US" sz="1600" dirty="0"/>
-              <a:t>a1e8fb5</a:t>
-            </a:r>
-            <a:r>
-              <a:rPr lang="en-US" sz="1600" dirty="0"/>
-              <a:t> commit. You can look at files, compile the project, run tests, and even edit files without worrying about losing the current state of the project. </a:t>
+              <a:t>This makes your working directory match the exact state of the a1e8fb5 commit. You can look at files, compile the project, run tests, and even edit files without worrying about losing the current state of the project. </a:t>
             </a:r>
             <a:r>
               <a:rPr lang="en-US" sz="1600" i="1" dirty="0"/>
@@ -37032,7 +36666,6 @@
               <a:rPr lang="en-US" sz="1600" dirty="0"/>
               <a:t> you do in here will be saved in your repository. To continue developing, you need to get back to the “current” state of your project:</a:t>
             </a:r>
-            <a:endParaRPr lang="en-US" sz="1600" dirty="0"/>
           </a:p>
         </p:txBody>
       </p:sp>
@@ -37774,7 +37407,6 @@
               <a:rPr lang="en-US" dirty="0"/>
               <a:t>This tutorial provides all of the necessary skills to work with previous revisions of a software project. First, it shows you how to explore old commits, then it explains the difference between reverting public commits in the project history vs. resetting unpublished changes on your local machine.</a:t>
             </a:r>
-            <a:endParaRPr lang="en-US" dirty="0"/>
           </a:p>
         </p:txBody>
       </p:sp>
@@ -37869,11 +37501,7 @@
             </a:r>
             <a:r>
               <a:rPr lang="en-US" dirty="0"/>
-              <a:t> checkout</a:t>
-            </a:r>
-            <a:r>
-              <a:rPr lang="en-US" dirty="0"/>
-              <a:t> command serves three distinct functions: checking out files, checking out commits, and checking out branches. </a:t>
+              <a:t> checkout command serves three distinct functions: checking out files, checking out commits, and checking out branches. </a:t>
             </a:r>
             <a:endParaRPr lang="en-US" dirty="0" smtClean="0"/>
           </a:p>
@@ -37918,7 +37546,6 @@
               <a:rPr lang="en-US" dirty="0"/>
               <a:t>out a file lets you see an old version of that particular file, leaving the rest of your working directory untouched.</a:t>
             </a:r>
-            <a:endParaRPr lang="en-US" dirty="0"/>
           </a:p>
         </p:txBody>
       </p:sp>
@@ -38012,7 +37639,6 @@
               <a:rPr lang="en-US" sz="2400" dirty="0"/>
               <a:t>Return to the master branch. Branches are covered in depth in the next module, but for now, you can just think of this as a way to get back to the “current” state of the project.</a:t>
             </a:r>
-            <a:endParaRPr lang="en-US" sz="2400" dirty="0"/>
           </a:p>
         </p:txBody>
       </p:sp>
@@ -38130,13 +37756,6 @@
               </a:rPr>
               <a:t> checkout &lt;commit&gt; &lt;file&gt;</a:t>
             </a:r>
-            <a:endParaRPr lang="en-US" dirty="0">
-              <a:solidFill>
-                <a:schemeClr val="bg1">
-                  <a:lumMod val="50000"/>
-                </a:schemeClr>
-              </a:solidFill>
-            </a:endParaRPr>
           </a:p>
         </p:txBody>
       </p:sp>
@@ -38301,25 +37920,8 @@
           <a:p>
             <a:r>
               <a:rPr lang="en-US" sz="2400" dirty="0"/>
-              <a:t>Check out a previous version of a file. This turns the </a:t>
-            </a:r>
-            <a:r>
-              <a:rPr lang="en-US" sz="2400" dirty="0"/>
-              <a:t>&lt;file&gt;</a:t>
-            </a:r>
-            <a:r>
-              <a:rPr lang="en-US" sz="2400" dirty="0"/>
-              <a:t> that resides in the working directory into an exact copy of the one from </a:t>
-            </a:r>
-            <a:r>
-              <a:rPr lang="en-US" sz="2400" dirty="0"/>
-              <a:t>&lt;commit&gt;</a:t>
-            </a:r>
-            <a:r>
-              <a:rPr lang="en-US" sz="2400" dirty="0"/>
-              <a:t> and adds it to the staging area.</a:t>
-            </a:r>
-            <a:endParaRPr lang="en-US" sz="2400" dirty="0"/>
+              <a:t>Check out a previous version of a file. This turns the &lt;file&gt; that resides in the working directory into an exact copy of the one from &lt;commit&gt; and adds it to the staging area.</a:t>
+            </a:r>
           </a:p>
         </p:txBody>
       </p:sp>
@@ -38551,17 +38153,8 @@
           <a:p>
             <a:r>
               <a:rPr lang="en-US" sz="2400" dirty="0"/>
-              <a:t>Update all files in the working directory to match the specified commit. You can use either a commit hash or a tag as the </a:t>
-            </a:r>
-            <a:r>
-              <a:rPr lang="en-US" sz="2400" dirty="0"/>
-              <a:t>&lt;commit&gt;</a:t>
-            </a:r>
-            <a:r>
-              <a:rPr lang="en-US" sz="2400" dirty="0"/>
-              <a:t>argument. This will put you in a detached HEAD state.</a:t>
-            </a:r>
-            <a:endParaRPr lang="en-US" sz="2400" dirty="0"/>
+              <a:t>Update all files in the working directory to match the specified commit. You can use either a commit hash or a tag as the &lt;commit&gt;argument. This will put you in a detached HEAD state.</a:t>
+            </a:r>
           </a:p>
         </p:txBody>
       </p:sp>

</xml_diff>